<commit_message>
Added most of James's sugestions to paper
</commit_message>
<xml_diff>
--- a/article/images/architecture.pptx
+++ b/article/images/architecture.pptx
@@ -104,6 +104,11 @@
       </a:defRPr>
     </a:lvl9pPr>
   </p:defaultTextStyle>
+  <p:extLst>
+    <p:ext uri="{EFAFB233-063F-42B5-8137-9DF3F51BA10A}">
+      <p15:sldGuideLst xmlns:p15="http://schemas.microsoft.com/office/powerpoint/2012/main"/>
+    </p:ext>
+  </p:extLst>
 </p:presentation>
 </file>
 
@@ -238,7 +243,7 @@
           <a:p>
             <a:fld id="{4BC36853-C7D8-4B4E-B3C3-7E1744E67BC6}" type="datetimeFigureOut">
               <a:rPr lang="en-AU" smtClean="0"/>
-              <a:t>30/06/2021</a:t>
+              <a:t>12/07/2021</a:t>
             </a:fld>
             <a:endParaRPr lang="en-AU"/>
           </a:p>
@@ -408,7 +413,7 @@
           <a:p>
             <a:fld id="{4BC36853-C7D8-4B4E-B3C3-7E1744E67BC6}" type="datetimeFigureOut">
               <a:rPr lang="en-AU" smtClean="0"/>
-              <a:t>30/06/2021</a:t>
+              <a:t>12/07/2021</a:t>
             </a:fld>
             <a:endParaRPr lang="en-AU"/>
           </a:p>
@@ -588,7 +593,7 @@
           <a:p>
             <a:fld id="{4BC36853-C7D8-4B4E-B3C3-7E1744E67BC6}" type="datetimeFigureOut">
               <a:rPr lang="en-AU" smtClean="0"/>
-              <a:t>30/06/2021</a:t>
+              <a:t>12/07/2021</a:t>
             </a:fld>
             <a:endParaRPr lang="en-AU"/>
           </a:p>
@@ -758,7 +763,7 @@
           <a:p>
             <a:fld id="{4BC36853-C7D8-4B4E-B3C3-7E1744E67BC6}" type="datetimeFigureOut">
               <a:rPr lang="en-AU" smtClean="0"/>
-              <a:t>30/06/2021</a:t>
+              <a:t>12/07/2021</a:t>
             </a:fld>
             <a:endParaRPr lang="en-AU"/>
           </a:p>
@@ -1002,7 +1007,7 @@
           <a:p>
             <a:fld id="{4BC36853-C7D8-4B4E-B3C3-7E1744E67BC6}" type="datetimeFigureOut">
               <a:rPr lang="en-AU" smtClean="0"/>
-              <a:t>30/06/2021</a:t>
+              <a:t>12/07/2021</a:t>
             </a:fld>
             <a:endParaRPr lang="en-AU"/>
           </a:p>
@@ -1234,7 +1239,7 @@
           <a:p>
             <a:fld id="{4BC36853-C7D8-4B4E-B3C3-7E1744E67BC6}" type="datetimeFigureOut">
               <a:rPr lang="en-AU" smtClean="0"/>
-              <a:t>30/06/2021</a:t>
+              <a:t>12/07/2021</a:t>
             </a:fld>
             <a:endParaRPr lang="en-AU"/>
           </a:p>
@@ -1601,7 +1606,7 @@
           <a:p>
             <a:fld id="{4BC36853-C7D8-4B4E-B3C3-7E1744E67BC6}" type="datetimeFigureOut">
               <a:rPr lang="en-AU" smtClean="0"/>
-              <a:t>30/06/2021</a:t>
+              <a:t>12/07/2021</a:t>
             </a:fld>
             <a:endParaRPr lang="en-AU"/>
           </a:p>
@@ -1719,7 +1724,7 @@
           <a:p>
             <a:fld id="{4BC36853-C7D8-4B4E-B3C3-7E1744E67BC6}" type="datetimeFigureOut">
               <a:rPr lang="en-AU" smtClean="0"/>
-              <a:t>30/06/2021</a:t>
+              <a:t>12/07/2021</a:t>
             </a:fld>
             <a:endParaRPr lang="en-AU"/>
           </a:p>
@@ -1814,7 +1819,7 @@
           <a:p>
             <a:fld id="{4BC36853-C7D8-4B4E-B3C3-7E1744E67BC6}" type="datetimeFigureOut">
               <a:rPr lang="en-AU" smtClean="0"/>
-              <a:t>30/06/2021</a:t>
+              <a:t>12/07/2021</a:t>
             </a:fld>
             <a:endParaRPr lang="en-AU"/>
           </a:p>
@@ -2091,7 +2096,7 @@
           <a:p>
             <a:fld id="{4BC36853-C7D8-4B4E-B3C3-7E1744E67BC6}" type="datetimeFigureOut">
               <a:rPr lang="en-AU" smtClean="0"/>
-              <a:t>30/06/2021</a:t>
+              <a:t>12/07/2021</a:t>
             </a:fld>
             <a:endParaRPr lang="en-AU"/>
           </a:p>
@@ -2348,7 +2353,7 @@
           <a:p>
             <a:fld id="{4BC36853-C7D8-4B4E-B3C3-7E1744E67BC6}" type="datetimeFigureOut">
               <a:rPr lang="en-AU" smtClean="0"/>
-              <a:t>30/06/2021</a:t>
+              <a:t>12/07/2021</a:t>
             </a:fld>
             <a:endParaRPr lang="en-AU"/>
           </a:p>
@@ -2561,7 +2566,7 @@
           <a:p>
             <a:fld id="{4BC36853-C7D8-4B4E-B3C3-7E1744E67BC6}" type="datetimeFigureOut">
               <a:rPr lang="en-AU" smtClean="0"/>
-              <a:t>30/06/2021</a:t>
+              <a:t>12/07/2021</a:t>
             </a:fld>
             <a:endParaRPr lang="en-AU"/>
           </a:p>
@@ -2996,6 +3001,7 @@
               </a:bodyPr>
               <a:lstStyle/>
               <a:p>
+                <a:pPr/>
                 <a14:m>
                   <m:oMathPara xmlns:m="http://schemas.openxmlformats.org/officeDocument/2006/math">
                     <m:oMathParaPr>
@@ -3005,7 +3011,7 @@
                       <m:sSub>
                         <m:sSubPr>
                           <m:ctrlPr>
-                            <a:rPr lang="en-AU" sz="1801" i="1">
+                            <a:rPr lang="en-AU" sz="1801" i="1" smtClean="0">
                               <a:latin typeface="Cambria Math" panose="02040503050406030204" pitchFamily="18" charset="0"/>
                               <a:ea typeface="Cambria Math" panose="02040503050406030204" pitchFamily="18" charset="0"/>
                             </a:rPr>
@@ -3212,7 +3218,7 @@
             <p:spPr>
               <a:xfrm>
                 <a:off x="321773" y="3993204"/>
-                <a:ext cx="2633138" cy="646587"/>
+                <a:ext cx="2633138" cy="659155"/>
               </a:xfrm>
               <a:prstGeom prst="rect">
                 <a:avLst/>
@@ -3225,21 +3231,22 @@
               </a:bodyPr>
               <a:lstStyle/>
               <a:p>
+                <a:pPr/>
                 <a14:m>
                   <m:oMathPara xmlns:m="http://schemas.openxmlformats.org/officeDocument/2006/math">
                     <m:oMathParaPr>
                       <m:jc m:val="centerGroup"/>
                     </m:oMathParaPr>
                     <m:oMath xmlns:m="http://schemas.openxmlformats.org/officeDocument/2006/math">
-                      <m:sSub>
-                        <m:sSubPr>
+                      <m:sSubSup>
+                        <m:sSubSupPr>
                           <m:ctrlPr>
-                            <a:rPr lang="en-AU" sz="1801" i="1">
+                            <a:rPr lang="en-AU" sz="1801" b="0" i="1" smtClean="0">
                               <a:latin typeface="Cambria Math" panose="02040503050406030204" pitchFamily="18" charset="0"/>
                               <a:ea typeface="Cambria Math" panose="02040503050406030204" pitchFamily="18" charset="0"/>
                             </a:rPr>
                           </m:ctrlPr>
-                        </m:sSubPr>
+                        </m:sSubSupPr>
                         <m:e>
                           <m:r>
                             <a:rPr lang="en-AU" sz="1801" i="1">
@@ -3258,16 +3265,25 @@
                             <m:t>0</m:t>
                           </m:r>
                         </m:sub>
-                      </m:sSub>
-                      <m:sSub>
-                        <m:sSubPr>
+                        <m:sup>
+                          <m:r>
+                            <a:rPr lang="en-AU" sz="1801" b="0" i="1" smtClean="0">
+                              <a:latin typeface="Cambria Math" panose="02040503050406030204" pitchFamily="18" charset="0"/>
+                              <a:ea typeface="Cambria Math" panose="02040503050406030204" pitchFamily="18" charset="0"/>
+                            </a:rPr>
+                            <m:t>𝑘</m:t>
+                          </m:r>
+                        </m:sup>
+                      </m:sSubSup>
+                      <m:sSubSup>
+                        <m:sSubSupPr>
                           <m:ctrlPr>
-                            <a:rPr lang="en-AU" sz="1801" i="1">
+                            <a:rPr lang="en-AU" sz="1801" b="0" i="1" smtClean="0">
                               <a:latin typeface="Cambria Math" panose="02040503050406030204" pitchFamily="18" charset="0"/>
                               <a:ea typeface="Cambria Math" panose="02040503050406030204" pitchFamily="18" charset="0"/>
                             </a:rPr>
                           </m:ctrlPr>
-                        </m:sSubPr>
+                        </m:sSubSupPr>
                         <m:e>
                           <m:r>
                             <a:rPr lang="en-AU" sz="1801" i="1">
@@ -3286,7 +3302,16 @@
                             <m:t>1</m:t>
                           </m:r>
                         </m:sub>
-                      </m:sSub>
+                        <m:sup>
+                          <m:r>
+                            <a:rPr lang="en-AU" sz="1801" b="0" i="1" smtClean="0">
+                              <a:latin typeface="Cambria Math" panose="02040503050406030204" pitchFamily="18" charset="0"/>
+                              <a:ea typeface="Cambria Math" panose="02040503050406030204" pitchFamily="18" charset="0"/>
+                            </a:rPr>
+                            <m:t>𝑘</m:t>
+                          </m:r>
+                        </m:sup>
+                      </m:sSubSup>
                       <m:r>
                         <a:rPr lang="en-AU" sz="1801" i="1">
                           <a:latin typeface="Cambria Math" panose="02040503050406030204" pitchFamily="18" charset="0"/>
@@ -3294,15 +3319,15 @@
                         </a:rPr>
                         <m:t>⋯</m:t>
                       </m:r>
-                      <m:sSub>
-                        <m:sSubPr>
+                      <m:sSubSup>
+                        <m:sSubSupPr>
                           <m:ctrlPr>
-                            <a:rPr lang="en-AU" sz="1801" i="1">
+                            <a:rPr lang="en-AU" sz="1801" b="0" i="1" smtClean="0">
                               <a:latin typeface="Cambria Math" panose="02040503050406030204" pitchFamily="18" charset="0"/>
                               <a:ea typeface="Cambria Math" panose="02040503050406030204" pitchFamily="18" charset="0"/>
                             </a:rPr>
                           </m:ctrlPr>
-                        </m:sSubPr>
+                        </m:sSubSupPr>
                         <m:e>
                           <m:r>
                             <a:rPr lang="en-AU" sz="1801" i="1">
@@ -3321,7 +3346,16 @@
                             <m:t>𝑙</m:t>
                           </m:r>
                         </m:sub>
-                      </m:sSub>
+                        <m:sup>
+                          <m:r>
+                            <a:rPr lang="en-AU" sz="1801" b="0" i="1" smtClean="0">
+                              <a:latin typeface="Cambria Math" panose="02040503050406030204" pitchFamily="18" charset="0"/>
+                              <a:ea typeface="Cambria Math" panose="02040503050406030204" pitchFamily="18" charset="0"/>
+                            </a:rPr>
+                            <m:t>𝑘</m:t>
+                          </m:r>
+                        </m:sup>
+                      </m:sSubSup>
                       <m:r>
                         <a:rPr lang="en-AU" sz="1801" i="1">
                           <a:latin typeface="Cambria Math" panose="02040503050406030204" pitchFamily="18" charset="0"/>
@@ -3329,15 +3363,15 @@
                         </a:rPr>
                         <m:t>⋯</m:t>
                       </m:r>
-                      <m:sSub>
-                        <m:sSubPr>
+                      <m:sSubSup>
+                        <m:sSubSupPr>
                           <m:ctrlPr>
-                            <a:rPr lang="en-AU" sz="1801" i="1">
+                            <a:rPr lang="en-AU" sz="1801" b="0" i="1" smtClean="0">
                               <a:latin typeface="Cambria Math" panose="02040503050406030204" pitchFamily="18" charset="0"/>
                               <a:ea typeface="Cambria Math" panose="02040503050406030204" pitchFamily="18" charset="0"/>
                             </a:rPr>
                           </m:ctrlPr>
-                        </m:sSubPr>
+                        </m:sSubSupPr>
                         <m:e>
                           <m:r>
                             <a:rPr lang="en-AU" sz="1801" i="1">
@@ -3363,14 +3397,22 @@
                             <m:t>−1</m:t>
                           </m:r>
                         </m:sub>
-                      </m:sSub>
+                        <m:sup>
+                          <m:r>
+                            <a:rPr lang="en-AU" sz="1801" b="0" i="1" smtClean="0">
+                              <a:latin typeface="Cambria Math" panose="02040503050406030204" pitchFamily="18" charset="0"/>
+                              <a:ea typeface="Cambria Math" panose="02040503050406030204" pitchFamily="18" charset="0"/>
+                            </a:rPr>
+                            <m:t>𝑘</m:t>
+                          </m:r>
+                        </m:sup>
+                      </m:sSubSup>
                     </m:oMath>
                   </m:oMathPara>
                 </a14:m>
                 <a:endParaRPr lang="en-AU" sz="1801" dirty="0"/>
               </a:p>
               <a:p>
-                <a:pPr/>
                 <a:endParaRPr lang="en-AU" sz="1801" dirty="0">
                   <a:ea typeface="Cambria Math" panose="02040503050406030204" pitchFamily="18" charset="0"/>
                 </a:endParaRPr>
@@ -3396,7 +3438,7 @@
             <p:spPr>
               <a:xfrm>
                 <a:off x="321773" y="3993204"/>
-                <a:ext cx="2633138" cy="646587"/>
+                <a:ext cx="2633138" cy="659155"/>
               </a:xfrm>
               <a:prstGeom prst="rect">
                 <a:avLst/>
@@ -3499,8 +3541,8 @@
           </a:fontRef>
         </p:style>
       </p:cxnSp>
-      <mc:AlternateContent xmlns:mc="http://schemas.openxmlformats.org/markup-compatibility/2006">
-        <mc:Choice xmlns:a14="http://schemas.microsoft.com/office/drawing/2010/main" Requires="a14">
+      <mc:AlternateContent xmlns:mc="http://schemas.openxmlformats.org/markup-compatibility/2006" xmlns:a14="http://schemas.microsoft.com/office/drawing/2010/main">
+        <mc:Choice Requires="a14">
           <p:sp>
             <p:nvSpPr>
               <p:cNvPr id="29" name="TextBox 28">
@@ -3529,7 +3571,6 @@
               </a:bodyPr>
               <a:lstStyle/>
               <a:p>
-                <a:pPr/>
                 <a14:m>
                   <m:oMath xmlns:m="http://schemas.openxmlformats.org/officeDocument/2006/math">
                     <m:r>
@@ -3727,7 +3768,7 @@
             </p:txBody>
           </p:sp>
         </mc:Choice>
-        <mc:Fallback>
+        <mc:Fallback xmlns="">
           <p:sp>
             <p:nvSpPr>
               <p:cNvPr id="29" name="TextBox 28">
@@ -3848,8 +3889,8 @@
           </a:fontRef>
         </p:style>
       </p:cxnSp>
-      <mc:AlternateContent xmlns:mc="http://schemas.openxmlformats.org/markup-compatibility/2006">
-        <mc:Choice xmlns:a14="http://schemas.microsoft.com/office/drawing/2010/main" Requires="a14">
+      <mc:AlternateContent xmlns:mc="http://schemas.openxmlformats.org/markup-compatibility/2006" xmlns:a14="http://schemas.microsoft.com/office/drawing/2010/main">
+        <mc:Choice Requires="a14">
           <p:sp>
             <p:nvSpPr>
               <p:cNvPr id="38" name="TextBox 37">
@@ -3980,7 +4021,7 @@
             </p:txBody>
           </p:sp>
         </mc:Choice>
-        <mc:Fallback>
+        <mc:Fallback xmlns="">
           <p:sp>
             <p:nvSpPr>
               <p:cNvPr id="38" name="TextBox 37">
@@ -4961,8 +5002,8 @@
           </p:txBody>
         </p:sp>
       </p:grpSp>
-      <mc:AlternateContent xmlns:mc="http://schemas.openxmlformats.org/markup-compatibility/2006">
-        <mc:Choice xmlns:a14="http://schemas.microsoft.com/office/drawing/2010/main" Requires="a14">
+      <mc:AlternateContent xmlns:mc="http://schemas.openxmlformats.org/markup-compatibility/2006" xmlns:a14="http://schemas.microsoft.com/office/drawing/2010/main">
+        <mc:Choice Requires="a14">
           <p:sp>
             <p:nvSpPr>
               <p:cNvPr id="70" name="TextBox 69">
@@ -5013,7 +5054,7 @@
             </p:txBody>
           </p:sp>
         </mc:Choice>
-        <mc:Fallback>
+        <mc:Fallback xmlns="">
           <p:sp>
             <p:nvSpPr>
               <p:cNvPr id="70" name="TextBox 69">
@@ -5058,8 +5099,8 @@
           </p:sp>
         </mc:Fallback>
       </mc:AlternateContent>
-      <mc:AlternateContent xmlns:mc="http://schemas.openxmlformats.org/markup-compatibility/2006">
-        <mc:Choice xmlns:a14="http://schemas.microsoft.com/office/drawing/2010/main" Requires="a14">
+      <mc:AlternateContent xmlns:mc="http://schemas.openxmlformats.org/markup-compatibility/2006" xmlns:a14="http://schemas.microsoft.com/office/drawing/2010/main">
+        <mc:Choice Requires="a14">
           <p:sp>
             <p:nvSpPr>
               <p:cNvPr id="71" name="TextBox 70">
@@ -5110,7 +5151,7 @@
             </p:txBody>
           </p:sp>
         </mc:Choice>
-        <mc:Fallback>
+        <mc:Fallback xmlns="">
           <p:sp>
             <p:nvSpPr>
               <p:cNvPr id="71" name="TextBox 70">
@@ -5319,8 +5360,8 @@
           </a:fontRef>
         </p:style>
       </p:cxnSp>
-      <mc:AlternateContent xmlns:mc="http://schemas.openxmlformats.org/markup-compatibility/2006">
-        <mc:Choice xmlns:a14="http://schemas.microsoft.com/office/drawing/2010/main" Requires="a14">
+      <mc:AlternateContent xmlns:mc="http://schemas.openxmlformats.org/markup-compatibility/2006" xmlns:a14="http://schemas.microsoft.com/office/drawing/2010/main">
+        <mc:Choice Requires="a14">
           <p:sp>
             <p:nvSpPr>
               <p:cNvPr id="96" name="TextBox 95">
@@ -5349,6 +5390,7 @@
               </a:bodyPr>
               <a:lstStyle/>
               <a:p>
+                <a:pPr/>
                 <a14:m>
                   <m:oMathPara xmlns:m="http://schemas.openxmlformats.org/officeDocument/2006/math">
                     <m:oMathParaPr>
@@ -5461,7 +5503,7 @@
             </p:txBody>
           </p:sp>
         </mc:Choice>
-        <mc:Fallback>
+        <mc:Fallback xmlns="">
           <p:sp>
             <p:nvSpPr>
               <p:cNvPr id="96" name="TextBox 95">
@@ -5601,8 +5643,8 @@
           </p:style>
         </p:cxnSp>
       </p:grpSp>
-      <mc:AlternateContent xmlns:mc="http://schemas.openxmlformats.org/markup-compatibility/2006">
-        <mc:Choice xmlns:a14="http://schemas.microsoft.com/office/drawing/2010/main" Requires="a14">
+      <mc:AlternateContent xmlns:mc="http://schemas.openxmlformats.org/markup-compatibility/2006" xmlns:a14="http://schemas.microsoft.com/office/drawing/2010/main">
+        <mc:Choice Requires="a14">
           <p:sp>
             <p:nvSpPr>
               <p:cNvPr id="101" name="TextBox 100">
@@ -5631,6 +5673,7 @@
               </a:bodyPr>
               <a:lstStyle/>
               <a:p>
+                <a:pPr/>
                 <a14:m>
                   <m:oMathPara xmlns:m="http://schemas.openxmlformats.org/officeDocument/2006/math">
                     <m:oMathParaPr>
@@ -5743,7 +5786,7 @@
             </p:txBody>
           </p:sp>
         </mc:Choice>
-        <mc:Fallback>
+        <mc:Fallback xmlns="">
           <p:sp>
             <p:nvSpPr>
               <p:cNvPr id="101" name="TextBox 100">

</xml_diff>